<commit_message>
Implementation of Kuiroda-sensei's corrections
</commit_message>
<xml_diff>
--- a/02-GrowthQDs/Pictures/ArrheniusCr.pptx
+++ b/02-GrowthQDs/Pictures/ArrheniusCr.pptx
@@ -1978,11 +1978,11 @@
           <c:showPercent val="0"/>
           <c:showBubbleSize val="0"/>
         </c:dLbls>
-        <c:axId val="133666688"/>
-        <c:axId val="133731072"/>
+        <c:axId val="164615296"/>
+        <c:axId val="164616832"/>
       </c:scatterChart>
       <c:valAx>
-        <c:axId val="133666688"/>
+        <c:axId val="164615296"/>
         <c:scaling>
           <c:orientation val="minMax"/>
           <c:max val="1"/>
@@ -2004,10 +2004,17 @@
                     <a:latin typeface="Times New Roman" panose="02020603050405020304" pitchFamily="18" charset="0"/>
                     <a:cs typeface="Times New Roman" panose="02020603050405020304" pitchFamily="18" charset="0"/>
                   </a:rPr>
-                  <a:t>1000/T (°C</a:t>
+                  <a:t>1000/T </a:t>
                 </a:r>
                 <a:r>
-                  <a:rPr lang="fr-FR" sz="1800" baseline="30000" dirty="0">
+                  <a:rPr lang="fr-FR" sz="1800" dirty="0" smtClean="0">
+                    <a:latin typeface="Times New Roman" panose="02020603050405020304" pitchFamily="18" charset="0"/>
+                    <a:cs typeface="Times New Roman" panose="02020603050405020304" pitchFamily="18" charset="0"/>
+                  </a:rPr>
+                  <a:t>(K</a:t>
+                </a:r>
+                <a:r>
+                  <a:rPr lang="fr-FR" sz="1800" baseline="30000" dirty="0" smtClean="0">
                     <a:latin typeface="Times New Roman" panose="02020603050405020304" pitchFamily="18" charset="0"/>
                     <a:cs typeface="Times New Roman" panose="02020603050405020304" pitchFamily="18" charset="0"/>
                   </a:rPr>
@@ -2042,12 +2049,12 @@
             <a:endParaRPr lang="fr-FR"/>
           </a:p>
         </c:txPr>
-        <c:crossAx val="133731072"/>
+        <c:crossAx val="164616832"/>
         <c:crossesAt val="1.0000000000000006E-10"/>
         <c:crossBetween val="midCat"/>
       </c:valAx>
       <c:valAx>
-        <c:axId val="133731072"/>
+        <c:axId val="164616832"/>
         <c:scaling>
           <c:logBase val="10"/>
           <c:orientation val="minMax"/>
@@ -2106,7 +2113,7 @@
             <a:endParaRPr lang="fr-FR"/>
           </a:p>
         </c:txPr>
-        <c:crossAx val="133666688"/>
+        <c:crossAx val="164615296"/>
         <c:crosses val="autoZero"/>
         <c:crossBetween val="midCat"/>
       </c:valAx>
@@ -2302,7 +2309,7 @@
           <a:p>
             <a:fld id="{68A9FAC6-E281-424B-A74C-4D71BA18BCDC}" type="datetimeFigureOut">
               <a:rPr lang="fr-FR" smtClean="0"/>
-              <a:t>12/10/2017</a:t>
+              <a:t>30/01/2018</a:t>
             </a:fld>
             <a:endParaRPr lang="fr-FR"/>
           </a:p>
@@ -2472,7 +2479,7 @@
           <a:p>
             <a:fld id="{68A9FAC6-E281-424B-A74C-4D71BA18BCDC}" type="datetimeFigureOut">
               <a:rPr lang="fr-FR" smtClean="0"/>
-              <a:t>12/10/2017</a:t>
+              <a:t>30/01/2018</a:t>
             </a:fld>
             <a:endParaRPr lang="fr-FR"/>
           </a:p>
@@ -2652,7 +2659,7 @@
           <a:p>
             <a:fld id="{68A9FAC6-E281-424B-A74C-4D71BA18BCDC}" type="datetimeFigureOut">
               <a:rPr lang="fr-FR" smtClean="0"/>
-              <a:t>12/10/2017</a:t>
+              <a:t>30/01/2018</a:t>
             </a:fld>
             <a:endParaRPr lang="fr-FR"/>
           </a:p>
@@ -2822,7 +2829,7 @@
           <a:p>
             <a:fld id="{68A9FAC6-E281-424B-A74C-4D71BA18BCDC}" type="datetimeFigureOut">
               <a:rPr lang="fr-FR" smtClean="0"/>
-              <a:t>12/10/2017</a:t>
+              <a:t>30/01/2018</a:t>
             </a:fld>
             <a:endParaRPr lang="fr-FR"/>
           </a:p>
@@ -3068,7 +3075,7 @@
           <a:p>
             <a:fld id="{68A9FAC6-E281-424B-A74C-4D71BA18BCDC}" type="datetimeFigureOut">
               <a:rPr lang="fr-FR" smtClean="0"/>
-              <a:t>12/10/2017</a:t>
+              <a:t>30/01/2018</a:t>
             </a:fld>
             <a:endParaRPr lang="fr-FR"/>
           </a:p>
@@ -3356,7 +3363,7 @@
           <a:p>
             <a:fld id="{68A9FAC6-E281-424B-A74C-4D71BA18BCDC}" type="datetimeFigureOut">
               <a:rPr lang="fr-FR" smtClean="0"/>
-              <a:t>12/10/2017</a:t>
+              <a:t>30/01/2018</a:t>
             </a:fld>
             <a:endParaRPr lang="fr-FR"/>
           </a:p>
@@ -3778,7 +3785,7 @@
           <a:p>
             <a:fld id="{68A9FAC6-E281-424B-A74C-4D71BA18BCDC}" type="datetimeFigureOut">
               <a:rPr lang="fr-FR" smtClean="0"/>
-              <a:t>12/10/2017</a:t>
+              <a:t>30/01/2018</a:t>
             </a:fld>
             <a:endParaRPr lang="fr-FR"/>
           </a:p>
@@ -3896,7 +3903,7 @@
           <a:p>
             <a:fld id="{68A9FAC6-E281-424B-A74C-4D71BA18BCDC}" type="datetimeFigureOut">
               <a:rPr lang="fr-FR" smtClean="0"/>
-              <a:t>12/10/2017</a:t>
+              <a:t>30/01/2018</a:t>
             </a:fld>
             <a:endParaRPr lang="fr-FR"/>
           </a:p>
@@ -3991,7 +3998,7 @@
           <a:p>
             <a:fld id="{68A9FAC6-E281-424B-A74C-4D71BA18BCDC}" type="datetimeFigureOut">
               <a:rPr lang="fr-FR" smtClean="0"/>
-              <a:t>12/10/2017</a:t>
+              <a:t>30/01/2018</a:t>
             </a:fld>
             <a:endParaRPr lang="fr-FR"/>
           </a:p>
@@ -4268,7 +4275,7 @@
           <a:p>
             <a:fld id="{68A9FAC6-E281-424B-A74C-4D71BA18BCDC}" type="datetimeFigureOut">
               <a:rPr lang="fr-FR" smtClean="0"/>
-              <a:t>12/10/2017</a:t>
+              <a:t>30/01/2018</a:t>
             </a:fld>
             <a:endParaRPr lang="fr-FR"/>
           </a:p>
@@ -4521,7 +4528,7 @@
           <a:p>
             <a:fld id="{68A9FAC6-E281-424B-A74C-4D71BA18BCDC}" type="datetimeFigureOut">
               <a:rPr lang="fr-FR" smtClean="0"/>
-              <a:t>12/10/2017</a:t>
+              <a:t>30/01/2018</a:t>
             </a:fld>
             <a:endParaRPr lang="fr-FR"/>
           </a:p>
@@ -4734,7 +4741,7 @@
           <a:p>
             <a:fld id="{68A9FAC6-E281-424B-A74C-4D71BA18BCDC}" type="datetimeFigureOut">
               <a:rPr lang="fr-FR" smtClean="0"/>
-              <a:t>12/10/2017</a:t>
+              <a:t>30/01/2018</a:t>
             </a:fld>
             <a:endParaRPr lang="fr-FR"/>
           </a:p>
@@ -5118,7 +5125,7 @@
           <p:nvPr>
             <p:extLst>
               <p:ext uri="{D42A27DB-BD31-4B8C-83A1-F6EECF244321}">
-                <p14:modId xmlns:p14="http://schemas.microsoft.com/office/powerpoint/2010/main" val="665460981"/>
+                <p14:modId xmlns:p14="http://schemas.microsoft.com/office/powerpoint/2010/main" val="2467972392"/>
               </p:ext>
             </p:extLst>
           </p:nvPr>
@@ -5169,8 +5176,33 @@
                 <a:latin typeface="Times New Roman" panose="02020603050405020304" pitchFamily="18" charset="0"/>
                 <a:cs typeface="Times New Roman" panose="02020603050405020304" pitchFamily="18" charset="0"/>
               </a:rPr>
-              <a:t>a = -15.2382°C</a:t>
-            </a:r>
+              <a:t>a = -</a:t>
+            </a:r>
+            <a:r>
+              <a:rPr lang="fr-FR" sz="1600" dirty="0" smtClean="0">
+                <a:latin typeface="Times New Roman" panose="02020603050405020304" pitchFamily="18" charset="0"/>
+                <a:cs typeface="Times New Roman" panose="02020603050405020304" pitchFamily="18" charset="0"/>
+              </a:rPr>
+              <a:t>15.2382</a:t>
+            </a:r>
+            <a:r>
+              <a:rPr lang="fr-FR" sz="1600" dirty="0">
+                <a:latin typeface="Times New Roman" panose="02020603050405020304" pitchFamily="18" charset="0"/>
+                <a:cs typeface="Times New Roman" panose="02020603050405020304" pitchFamily="18" charset="0"/>
+              </a:rPr>
+              <a:t> </a:t>
+            </a:r>
+            <a:r>
+              <a:rPr lang="fr-FR" sz="1600" dirty="0" smtClean="0">
+                <a:latin typeface="Times New Roman" panose="02020603050405020304" pitchFamily="18" charset="0"/>
+                <a:cs typeface="Times New Roman" panose="02020603050405020304" pitchFamily="18" charset="0"/>
+              </a:rPr>
+              <a:t>K</a:t>
+            </a:r>
+            <a:endParaRPr lang="fr-FR" sz="1600" dirty="0" smtClean="0">
+              <a:latin typeface="Times New Roman" panose="02020603050405020304" pitchFamily="18" charset="0"/>
+              <a:cs typeface="Times New Roman" panose="02020603050405020304" pitchFamily="18" charset="0"/>
+            </a:endParaRPr>
           </a:p>
           <a:p>
             <a:r>

</xml_diff>